<commit_message>
Lecture slides and notebooks
</commit_message>
<xml_diff>
--- a/lectures/3_coding_practices.pptx
+++ b/lectures/3_coding_practices.pptx
@@ -5,7 +5,7 @@
     <p:sldMasterId id="2147483660" r:id="rId1"/>
   </p:sldMasterIdLst>
   <p:notesMasterIdLst>
-    <p:notesMasterId r:id="rId30"/>
+    <p:notesMasterId r:id="rId18"/>
   </p:notesMasterIdLst>
   <p:sldIdLst>
     <p:sldId id="279" r:id="rId2"/>
@@ -24,18 +24,6 @@
     <p:sldId id="318" r:id="rId15"/>
     <p:sldId id="280" r:id="rId16"/>
     <p:sldId id="319" r:id="rId17"/>
-    <p:sldId id="321" r:id="rId18"/>
-    <p:sldId id="308" r:id="rId19"/>
-    <p:sldId id="289" r:id="rId20"/>
-    <p:sldId id="322" r:id="rId21"/>
-    <p:sldId id="297" r:id="rId22"/>
-    <p:sldId id="290" r:id="rId23"/>
-    <p:sldId id="291" r:id="rId24"/>
-    <p:sldId id="292" r:id="rId25"/>
-    <p:sldId id="293" r:id="rId26"/>
-    <p:sldId id="294" r:id="rId27"/>
-    <p:sldId id="295" r:id="rId28"/>
-    <p:sldId id="296" r:id="rId29"/>
   </p:sldIdLst>
   <p:sldSz cx="12192000" cy="6858000"/>
   <p:notesSz cx="6858000" cy="9144000"/>
@@ -227,7 +215,7 @@
           <a:p>
             <a:fld id="{7580552C-E0FB-45E2-A101-ECC7D678B809}" type="datetimeFigureOut">
               <a:rPr lang="en-GB" smtClean="0"/>
-              <a:t>09/08/2019</a:t>
+              <a:t>28/08/2019</a:t>
             </a:fld>
             <a:endParaRPr lang="en-GB"/>
           </a:p>
@@ -1379,98 +1367,6 @@
 </p:notes>
 </file>
 
-<file path=ppt/notesSlides/notesSlide8.xml><?xml version="1.0" encoding="utf-8"?>
-<p:notes xmlns:a="http://schemas.openxmlformats.org/drawingml/2006/main" xmlns:r="http://schemas.openxmlformats.org/officeDocument/2006/relationships" xmlns:p="http://schemas.openxmlformats.org/presentationml/2006/main">
-  <p:cSld>
-    <p:spTree>
-      <p:nvGrpSpPr>
-        <p:cNvPr id="1" name=""/>
-        <p:cNvGrpSpPr/>
-        <p:nvPr/>
-      </p:nvGrpSpPr>
-      <p:grpSpPr>
-        <a:xfrm>
-          <a:off x="0" y="0"/>
-          <a:ext cx="0" cy="0"/>
-          <a:chOff x="0" y="0"/>
-          <a:chExt cx="0" cy="0"/>
-        </a:xfrm>
-      </p:grpSpPr>
-      <p:sp>
-        <p:nvSpPr>
-          <p:cNvPr id="2" name="Tijdelijke aanduiding voor dia-afbeelding 1"/>
-          <p:cNvSpPr>
-            <a:spLocks noGrp="1" noRot="1" noChangeAspect="1"/>
-          </p:cNvSpPr>
-          <p:nvPr>
-            <p:ph type="sldImg"/>
-          </p:nvPr>
-        </p:nvSpPr>
-        <p:spPr/>
-      </p:sp>
-      <p:sp>
-        <p:nvSpPr>
-          <p:cNvPr id="3" name="Tijdelijke aanduiding voor notities 2"/>
-          <p:cNvSpPr>
-            <a:spLocks noGrp="1"/>
-          </p:cNvSpPr>
-          <p:nvPr>
-            <p:ph type="body" idx="1"/>
-          </p:nvPr>
-        </p:nvSpPr>
-        <p:spPr/>
-        <p:txBody>
-          <a:bodyPr/>
-          <a:lstStyle/>
-          <a:p>
-            <a:r>
-              <a:rPr lang="en-GB" dirty="0"/>
-              <a:t>Title</a:t>
-            </a:r>
-            <a:r>
-              <a:rPr lang="en-GB" baseline="0" dirty="0"/>
-              <a:t> slide: how to write good code part 3</a:t>
-            </a:r>
-            <a:endParaRPr lang="en-GB" dirty="0"/>
-          </a:p>
-        </p:txBody>
-      </p:sp>
-      <p:sp>
-        <p:nvSpPr>
-          <p:cNvPr id="4" name="Tijdelijke aanduiding voor dianummer 3"/>
-          <p:cNvSpPr>
-            <a:spLocks noGrp="1"/>
-          </p:cNvSpPr>
-          <p:nvPr>
-            <p:ph type="sldNum" sz="quarter" idx="10"/>
-          </p:nvPr>
-        </p:nvSpPr>
-        <p:spPr/>
-        <p:txBody>
-          <a:bodyPr/>
-          <a:lstStyle/>
-          <a:p>
-            <a:fld id="{F444804B-CB39-4353-9876-3F6CE789C0E5}" type="slidenum">
-              <a:rPr lang="en-GB" smtClean="0"/>
-              <a:t>17</a:t>
-            </a:fld>
-            <a:endParaRPr lang="en-GB"/>
-          </a:p>
-        </p:txBody>
-      </p:sp>
-    </p:spTree>
-    <p:extLst>
-      <p:ext uri="{BB962C8B-B14F-4D97-AF65-F5344CB8AC3E}">
-        <p14:creationId xmlns:p14="http://schemas.microsoft.com/office/powerpoint/2010/main" val="3366570043"/>
-      </p:ext>
-    </p:extLst>
-  </p:cSld>
-  <p:clrMapOvr>
-    <a:masterClrMapping/>
-  </p:clrMapOvr>
-</p:notes>
-</file>
-
 <file path=ppt/slideLayouts/slideLayout1.xml><?xml version="1.0" encoding="utf-8"?>
 <p:sldLayout xmlns:a="http://schemas.openxmlformats.org/drawingml/2006/main" xmlns:r="http://schemas.openxmlformats.org/officeDocument/2006/relationships" xmlns:p="http://schemas.openxmlformats.org/presentationml/2006/main" type="title" preserve="1">
   <p:cSld name="Titeldia">
@@ -1602,7 +1498,7 @@
           <a:p>
             <a:fld id="{D6602127-F9A8-4410-95C3-55BC73E82165}" type="datetimeFigureOut">
               <a:rPr lang="en-GB" smtClean="0"/>
-              <a:t>09/08/2019</a:t>
+              <a:t>28/08/2019</a:t>
             </a:fld>
             <a:endParaRPr lang="en-GB"/>
           </a:p>
@@ -1772,7 +1668,7 @@
           <a:p>
             <a:fld id="{D6602127-F9A8-4410-95C3-55BC73E82165}" type="datetimeFigureOut">
               <a:rPr lang="en-GB" smtClean="0"/>
-              <a:t>09/08/2019</a:t>
+              <a:t>28/08/2019</a:t>
             </a:fld>
             <a:endParaRPr lang="en-GB"/>
           </a:p>
@@ -1952,7 +1848,7 @@
           <a:p>
             <a:fld id="{D6602127-F9A8-4410-95C3-55BC73E82165}" type="datetimeFigureOut">
               <a:rPr lang="en-GB" smtClean="0"/>
-              <a:t>09/08/2019</a:t>
+              <a:t>28/08/2019</a:t>
             </a:fld>
             <a:endParaRPr lang="en-GB"/>
           </a:p>
@@ -2122,7 +2018,7 @@
           <a:p>
             <a:fld id="{D6602127-F9A8-4410-95C3-55BC73E82165}" type="datetimeFigureOut">
               <a:rPr lang="en-GB" smtClean="0"/>
-              <a:t>09/08/2019</a:t>
+              <a:t>28/08/2019</a:t>
             </a:fld>
             <a:endParaRPr lang="en-GB"/>
           </a:p>
@@ -2368,7 +2264,7 @@
           <a:p>
             <a:fld id="{D6602127-F9A8-4410-95C3-55BC73E82165}" type="datetimeFigureOut">
               <a:rPr lang="en-GB" smtClean="0"/>
-              <a:t>09/08/2019</a:t>
+              <a:t>28/08/2019</a:t>
             </a:fld>
             <a:endParaRPr lang="en-GB"/>
           </a:p>
@@ -2600,7 +2496,7 @@
           <a:p>
             <a:fld id="{D6602127-F9A8-4410-95C3-55BC73E82165}" type="datetimeFigureOut">
               <a:rPr lang="en-GB" smtClean="0"/>
-              <a:t>09/08/2019</a:t>
+              <a:t>28/08/2019</a:t>
             </a:fld>
             <a:endParaRPr lang="en-GB"/>
           </a:p>
@@ -2972,7 +2868,7 @@
           <a:p>
             <a:fld id="{D6602127-F9A8-4410-95C3-55BC73E82165}" type="datetimeFigureOut">
               <a:rPr lang="en-GB" smtClean="0"/>
-              <a:t>09/08/2019</a:t>
+              <a:t>28/08/2019</a:t>
             </a:fld>
             <a:endParaRPr lang="en-GB"/>
           </a:p>
@@ -3095,7 +2991,7 @@
           <a:p>
             <a:fld id="{D6602127-F9A8-4410-95C3-55BC73E82165}" type="datetimeFigureOut">
               <a:rPr lang="en-GB" smtClean="0"/>
-              <a:t>09/08/2019</a:t>
+              <a:t>28/08/2019</a:t>
             </a:fld>
             <a:endParaRPr lang="en-GB"/>
           </a:p>
@@ -3190,7 +3086,7 @@
           <a:p>
             <a:fld id="{D6602127-F9A8-4410-95C3-55BC73E82165}" type="datetimeFigureOut">
               <a:rPr lang="en-GB" smtClean="0"/>
-              <a:t>09/08/2019</a:t>
+              <a:t>28/08/2019</a:t>
             </a:fld>
             <a:endParaRPr lang="en-GB"/>
           </a:p>
@@ -3467,7 +3363,7 @@
           <a:p>
             <a:fld id="{D6602127-F9A8-4410-95C3-55BC73E82165}" type="datetimeFigureOut">
               <a:rPr lang="en-GB" smtClean="0"/>
-              <a:t>09/08/2019</a:t>
+              <a:t>28/08/2019</a:t>
             </a:fld>
             <a:endParaRPr lang="en-GB"/>
           </a:p>
@@ -3729,7 +3625,7 @@
           <a:p>
             <a:fld id="{D6602127-F9A8-4410-95C3-55BC73E82165}" type="datetimeFigureOut">
               <a:rPr lang="en-GB" smtClean="0"/>
-              <a:t>09/08/2019</a:t>
+              <a:t>28/08/2019</a:t>
             </a:fld>
             <a:endParaRPr lang="en-GB"/>
           </a:p>
@@ -3942,7 +3838,7 @@
           <a:p>
             <a:fld id="{D6602127-F9A8-4410-95C3-55BC73E82165}" type="datetimeFigureOut">
               <a:rPr lang="en-GB" smtClean="0"/>
-              <a:t>09/08/2019</a:t>
+              <a:t>28/08/2019</a:t>
             </a:fld>
             <a:endParaRPr lang="en-GB"/>
           </a:p>
@@ -6050,903 +5946,6 @@
 </p:sld>
 </file>
 
-<file path=ppt/slides/slide17.xml><?xml version="1.0" encoding="utf-8"?>
-<p:sld xmlns:a="http://schemas.openxmlformats.org/drawingml/2006/main" xmlns:r="http://schemas.openxmlformats.org/officeDocument/2006/relationships" xmlns:p="http://schemas.openxmlformats.org/presentationml/2006/main">
-  <p:cSld>
-    <p:spTree>
-      <p:nvGrpSpPr>
-        <p:cNvPr id="1" name=""/>
-        <p:cNvGrpSpPr/>
-        <p:nvPr/>
-      </p:nvGrpSpPr>
-      <p:grpSpPr>
-        <a:xfrm>
-          <a:off x="0" y="0"/>
-          <a:ext cx="0" cy="0"/>
-          <a:chOff x="0" y="0"/>
-          <a:chExt cx="0" cy="0"/>
-        </a:xfrm>
-      </p:grpSpPr>
-      <p:sp>
-        <p:nvSpPr>
-          <p:cNvPr id="2" name="Title 1"/>
-          <p:cNvSpPr>
-            <a:spLocks noGrp="1"/>
-          </p:cNvSpPr>
-          <p:nvPr>
-            <p:ph type="title"/>
-          </p:nvPr>
-        </p:nvSpPr>
-        <p:spPr>
-          <a:xfrm>
-            <a:off x="831850" y="3510359"/>
-            <a:ext cx="10515600" cy="2852737"/>
-          </a:xfrm>
-        </p:spPr>
-        <p:txBody>
-          <a:bodyPr/>
-          <a:lstStyle/>
-          <a:p>
-            <a:pPr algn="ctr"/>
-            <a:r>
-              <a:rPr lang="en-GB" dirty="0"/>
-              <a:t>Debugging and tests</a:t>
-            </a:r>
-            <a:br>
-              <a:rPr lang="en-GB" dirty="0"/>
-            </a:br>
-            <a:endParaRPr lang="en-GB" dirty="0"/>
-          </a:p>
-        </p:txBody>
-      </p:sp>
-      <p:pic>
-        <p:nvPicPr>
-          <p:cNvPr id="4" name="Picture 3"/>
-          <p:cNvPicPr>
-            <a:picLocks noChangeAspect="1"/>
-          </p:cNvPicPr>
-          <p:nvPr/>
-        </p:nvPicPr>
-        <p:blipFill rotWithShape="1">
-          <a:blip r:embed="rId3" cstate="print">
-            <a:extLst>
-              <a:ext uri="{28A0092B-C50C-407E-A947-70E740481C1C}">
-                <a14:useLocalDpi xmlns:a14="http://schemas.microsoft.com/office/drawing/2010/main" val="0"/>
-              </a:ext>
-            </a:extLst>
-          </a:blip>
-          <a:srcRect t="16503" b="15134"/>
-          <a:stretch/>
-        </p:blipFill>
-        <p:spPr>
-          <a:xfrm>
-            <a:off x="3823919" y="412489"/>
-            <a:ext cx="4531462" cy="3097870"/>
-          </a:xfrm>
-          <a:prstGeom prst="rect">
-            <a:avLst/>
-          </a:prstGeom>
-        </p:spPr>
-      </p:pic>
-    </p:spTree>
-    <p:extLst>
-      <p:ext uri="{BB962C8B-B14F-4D97-AF65-F5344CB8AC3E}">
-        <p14:creationId xmlns:p14="http://schemas.microsoft.com/office/powerpoint/2010/main" val="958512102"/>
-      </p:ext>
-    </p:extLst>
-  </p:cSld>
-  <p:clrMapOvr>
-    <a:masterClrMapping/>
-  </p:clrMapOvr>
-</p:sld>
-</file>
-
-<file path=ppt/slides/slide18.xml><?xml version="1.0" encoding="utf-8"?>
-<p:sld xmlns:a="http://schemas.openxmlformats.org/drawingml/2006/main" xmlns:r="http://schemas.openxmlformats.org/officeDocument/2006/relationships" xmlns:p="http://schemas.openxmlformats.org/presentationml/2006/main">
-  <p:cSld>
-    <p:spTree>
-      <p:nvGrpSpPr>
-        <p:cNvPr id="1" name=""/>
-        <p:cNvGrpSpPr/>
-        <p:nvPr/>
-      </p:nvGrpSpPr>
-      <p:grpSpPr>
-        <a:xfrm>
-          <a:off x="0" y="0"/>
-          <a:ext cx="0" cy="0"/>
-          <a:chOff x="0" y="0"/>
-          <a:chExt cx="0" cy="0"/>
-        </a:xfrm>
-      </p:grpSpPr>
-      <p:sp>
-        <p:nvSpPr>
-          <p:cNvPr id="2" name="Title 1"/>
-          <p:cNvSpPr>
-            <a:spLocks noGrp="1"/>
-          </p:cNvSpPr>
-          <p:nvPr>
-            <p:ph type="title"/>
-          </p:nvPr>
-        </p:nvSpPr>
-        <p:spPr/>
-        <p:txBody>
-          <a:bodyPr/>
-          <a:lstStyle/>
-          <a:p>
-            <a:r>
-              <a:rPr lang="en-GB" dirty="0"/>
-              <a:t>Python debugging</a:t>
-            </a:r>
-          </a:p>
-        </p:txBody>
-      </p:sp>
-      <p:sp>
-        <p:nvSpPr>
-          <p:cNvPr id="3" name="Content Placeholder 2"/>
-          <p:cNvSpPr>
-            <a:spLocks noGrp="1"/>
-          </p:cNvSpPr>
-          <p:nvPr>
-            <p:ph idx="1"/>
-          </p:nvPr>
-        </p:nvSpPr>
-        <p:spPr/>
-        <p:txBody>
-          <a:bodyPr/>
-          <a:lstStyle/>
-          <a:p>
-            <a:r>
-              <a:rPr lang="en-GB" dirty="0" err="1"/>
-              <a:t>pdb</a:t>
-            </a:r>
-            <a:r>
-              <a:rPr lang="en-GB" dirty="0"/>
-              <a:t> module</a:t>
-            </a:r>
-          </a:p>
-          <a:p>
-            <a:r>
-              <a:rPr lang="en-GB" dirty="0"/>
-              <a:t>Breakpoint:</a:t>
-            </a:r>
-          </a:p>
-          <a:p>
-            <a:pPr lvl="1"/>
-            <a:r>
-              <a:rPr lang="en-GB" dirty="0" err="1"/>
-              <a:t>Pdb</a:t>
-            </a:r>
-            <a:r>
-              <a:rPr lang="en-GB" dirty="0"/>
-              <a:t> -&gt; </a:t>
-            </a:r>
-            <a:r>
-              <a:rPr lang="en-GB" dirty="0" err="1"/>
-              <a:t>pdb.set_trace</a:t>
-            </a:r>
-            <a:r>
-              <a:rPr lang="en-GB" dirty="0"/>
-              <a:t>()</a:t>
-            </a:r>
-          </a:p>
-          <a:p>
-            <a:pPr lvl="1"/>
-            <a:r>
-              <a:rPr lang="en-GB" dirty="0"/>
-              <a:t>Python 3.7 -&gt; breakpoint()</a:t>
-            </a:r>
-          </a:p>
-          <a:p>
-            <a:r>
-              <a:rPr lang="en-GB" dirty="0"/>
-              <a:t>Stepping through</a:t>
-            </a:r>
-          </a:p>
-          <a:p>
-            <a:pPr lvl="1"/>
-            <a:r>
-              <a:rPr lang="en-GB" dirty="0"/>
-              <a:t>n (next)</a:t>
-            </a:r>
-          </a:p>
-          <a:p>
-            <a:pPr lvl="1"/>
-            <a:r>
-              <a:rPr lang="en-GB" dirty="0"/>
-              <a:t>s (step)</a:t>
-            </a:r>
-          </a:p>
-          <a:p>
-            <a:endParaRPr lang="en-GB" dirty="0"/>
-          </a:p>
-        </p:txBody>
-      </p:sp>
-      <p:pic>
-        <p:nvPicPr>
-          <p:cNvPr id="4" name="Picture 3"/>
-          <p:cNvPicPr>
-            <a:picLocks noChangeAspect="1"/>
-          </p:cNvPicPr>
-          <p:nvPr/>
-        </p:nvPicPr>
-        <p:blipFill>
-          <a:blip r:embed="rId2"/>
-          <a:stretch>
-            <a:fillRect/>
-          </a:stretch>
-        </p:blipFill>
-        <p:spPr>
-          <a:xfrm>
-            <a:off x="6534150" y="1027906"/>
-            <a:ext cx="4819650" cy="1695450"/>
-          </a:xfrm>
-          <a:prstGeom prst="rect">
-            <a:avLst/>
-          </a:prstGeom>
-          <a:ln>
-            <a:noFill/>
-          </a:ln>
-          <a:effectLst>
-            <a:outerShdw blurRad="190500" algn="tl" rotWithShape="0">
-              <a:srgbClr val="000000">
-                <a:alpha val="70000"/>
-              </a:srgbClr>
-            </a:outerShdw>
-          </a:effectLst>
-        </p:spPr>
-      </p:pic>
-      <p:sp>
-        <p:nvSpPr>
-          <p:cNvPr id="7" name="TextBox 6"/>
-          <p:cNvSpPr txBox="1"/>
-          <p:nvPr/>
-        </p:nvSpPr>
-        <p:spPr>
-          <a:xfrm>
-            <a:off x="6756977" y="3724356"/>
-            <a:ext cx="4373995" cy="923330"/>
-          </a:xfrm>
-          <a:prstGeom prst="rect">
-            <a:avLst/>
-          </a:prstGeom>
-          <a:solidFill>
-            <a:schemeClr val="bg2">
-              <a:lumMod val="10000"/>
-            </a:schemeClr>
-          </a:solidFill>
-          <a:effectLst>
-            <a:outerShdw blurRad="50800" dist="38100" dir="2700000" algn="tl" rotWithShape="0">
-              <a:prstClr val="black">
-                <a:alpha val="40000"/>
-              </a:prstClr>
-            </a:outerShdw>
-          </a:effectLst>
-        </p:spPr>
-        <p:txBody>
-          <a:bodyPr wrap="square" rtlCol="0">
-            <a:spAutoFit/>
-          </a:bodyPr>
-          <a:lstStyle/>
-          <a:p>
-            <a:r>
-              <a:rPr lang="en-GB" dirty="0">
-                <a:solidFill>
-                  <a:schemeClr val="bg1"/>
-                </a:solidFill>
-                <a:latin typeface="DejaVu Sans Mono" panose="020B0609030804020204" pitchFamily="49" charset="0"/>
-                <a:ea typeface="DejaVu Sans Mono" panose="020B0609030804020204" pitchFamily="49" charset="0"/>
-                <a:cs typeface="DejaVu Sans Mono" panose="020B0609030804020204" pitchFamily="49" charset="0"/>
-              </a:rPr>
-              <a:t>&gt; python epdb1.py</a:t>
-            </a:r>
-          </a:p>
-          <a:p>
-            <a:r>
-              <a:rPr lang="en-GB" dirty="0">
-                <a:solidFill>
-                  <a:schemeClr val="bg1"/>
-                </a:solidFill>
-                <a:latin typeface="DejaVu Sans Mono" panose="020B0609030804020204" pitchFamily="49" charset="0"/>
-                <a:ea typeface="DejaVu Sans Mono" panose="020B0609030804020204" pitchFamily="49" charset="0"/>
-                <a:cs typeface="DejaVu Sans Mono" panose="020B0609030804020204" pitchFamily="49" charset="0"/>
-              </a:rPr>
-              <a:t>-&gt; b = “</a:t>
-            </a:r>
-            <a:r>
-              <a:rPr lang="en-GB" dirty="0" err="1">
-                <a:solidFill>
-                  <a:schemeClr val="bg1"/>
-                </a:solidFill>
-                <a:latin typeface="DejaVu Sans Mono" panose="020B0609030804020204" pitchFamily="49" charset="0"/>
-                <a:ea typeface="DejaVu Sans Mono" panose="020B0609030804020204" pitchFamily="49" charset="0"/>
-                <a:cs typeface="DejaVu Sans Mono" panose="020B0609030804020204" pitchFamily="49" charset="0"/>
-              </a:rPr>
-              <a:t>bbb</a:t>
-            </a:r>
-            <a:r>
-              <a:rPr lang="en-GB" dirty="0">
-                <a:solidFill>
-                  <a:schemeClr val="bg1"/>
-                </a:solidFill>
-                <a:latin typeface="DejaVu Sans Mono" panose="020B0609030804020204" pitchFamily="49" charset="0"/>
-                <a:ea typeface="DejaVu Sans Mono" panose="020B0609030804020204" pitchFamily="49" charset="0"/>
-                <a:cs typeface="DejaVu Sans Mono" panose="020B0609030804020204" pitchFamily="49" charset="0"/>
-              </a:rPr>
-              <a:t>”</a:t>
-            </a:r>
-          </a:p>
-          <a:p>
-            <a:r>
-              <a:rPr lang="en-GB" dirty="0">
-                <a:solidFill>
-                  <a:schemeClr val="bg1"/>
-                </a:solidFill>
-                <a:latin typeface="DejaVu Sans Mono" panose="020B0609030804020204" pitchFamily="49" charset="0"/>
-                <a:ea typeface="DejaVu Sans Mono" panose="020B0609030804020204" pitchFamily="49" charset="0"/>
-                <a:cs typeface="DejaVu Sans Mono" panose="020B0609030804020204" pitchFamily="49" charset="0"/>
-              </a:rPr>
-              <a:t>(</a:t>
-            </a:r>
-            <a:r>
-              <a:rPr lang="en-GB" dirty="0" err="1">
-                <a:solidFill>
-                  <a:schemeClr val="bg1"/>
-                </a:solidFill>
-                <a:latin typeface="DejaVu Sans Mono" panose="020B0609030804020204" pitchFamily="49" charset="0"/>
-                <a:ea typeface="DejaVu Sans Mono" panose="020B0609030804020204" pitchFamily="49" charset="0"/>
-                <a:cs typeface="DejaVu Sans Mono" panose="020B0609030804020204" pitchFamily="49" charset="0"/>
-              </a:rPr>
-              <a:t>Pdb</a:t>
-            </a:r>
-            <a:r>
-              <a:rPr lang="en-GB" dirty="0">
-                <a:solidFill>
-                  <a:schemeClr val="bg1"/>
-                </a:solidFill>
-                <a:latin typeface="DejaVu Sans Mono" panose="020B0609030804020204" pitchFamily="49" charset="0"/>
-                <a:ea typeface="DejaVu Sans Mono" panose="020B0609030804020204" pitchFamily="49" charset="0"/>
-                <a:cs typeface="DejaVu Sans Mono" panose="020B0609030804020204" pitchFamily="49" charset="0"/>
-              </a:rPr>
-              <a:t>)</a:t>
-            </a:r>
-          </a:p>
-        </p:txBody>
-      </p:sp>
-    </p:spTree>
-    <p:extLst>
-      <p:ext uri="{BB962C8B-B14F-4D97-AF65-F5344CB8AC3E}">
-        <p14:creationId xmlns:p14="http://schemas.microsoft.com/office/powerpoint/2010/main" val="2212496940"/>
-      </p:ext>
-    </p:extLst>
-  </p:cSld>
-  <p:clrMapOvr>
-    <a:masterClrMapping/>
-  </p:clrMapOvr>
-  <p:timing>
-    <p:tnLst>
-      <p:par>
-        <p:cTn id="1" dur="indefinite" restart="never" nodeType="tmRoot">
-          <p:childTnLst>
-            <p:seq concurrent="1" nextAc="seek">
-              <p:cTn id="2" dur="indefinite" nodeType="mainSeq">
-                <p:childTnLst>
-                  <p:par>
-                    <p:cTn id="3" fill="hold">
-                      <p:stCondLst>
-                        <p:cond delay="indefinite"/>
-                      </p:stCondLst>
-                      <p:childTnLst>
-                        <p:par>
-                          <p:cTn id="4" fill="hold">
-                            <p:stCondLst>
-                              <p:cond delay="0"/>
-                            </p:stCondLst>
-                            <p:childTnLst>
-                              <p:par>
-                                <p:cTn id="5" presetID="1" presetClass="entr" presetSubtype="0" fill="hold" grpId="0" nodeType="clickEffect">
-                                  <p:stCondLst>
-                                    <p:cond delay="0"/>
-                                  </p:stCondLst>
-                                  <p:childTnLst>
-                                    <p:set>
-                                      <p:cBhvr>
-                                        <p:cTn id="6" dur="1" fill="hold">
-                                          <p:stCondLst>
-                                            <p:cond delay="0"/>
-                                          </p:stCondLst>
-                                        </p:cTn>
-                                        <p:tgtEl>
-                                          <p:spTgt spid="3">
-                                            <p:txEl>
-                                              <p:pRg st="0" end="0"/>
-                                            </p:txEl>
-                                          </p:spTgt>
-                                        </p:tgtEl>
-                                        <p:attrNameLst>
-                                          <p:attrName>style.visibility</p:attrName>
-                                        </p:attrNameLst>
-                                      </p:cBhvr>
-                                      <p:to>
-                                        <p:strVal val="visible"/>
-                                      </p:to>
-                                    </p:set>
-                                  </p:childTnLst>
-                                </p:cTn>
-                              </p:par>
-                            </p:childTnLst>
-                          </p:cTn>
-                        </p:par>
-                      </p:childTnLst>
-                    </p:cTn>
-                  </p:par>
-                  <p:par>
-                    <p:cTn id="7" fill="hold">
-                      <p:stCondLst>
-                        <p:cond delay="indefinite"/>
-                      </p:stCondLst>
-                      <p:childTnLst>
-                        <p:par>
-                          <p:cTn id="8" fill="hold">
-                            <p:stCondLst>
-                              <p:cond delay="0"/>
-                            </p:stCondLst>
-                            <p:childTnLst>
-                              <p:par>
-                                <p:cTn id="9" presetID="1" presetClass="entr" presetSubtype="0" fill="hold" grpId="0" nodeType="clickEffect">
-                                  <p:stCondLst>
-                                    <p:cond delay="0"/>
-                                  </p:stCondLst>
-                                  <p:childTnLst>
-                                    <p:set>
-                                      <p:cBhvr>
-                                        <p:cTn id="10" dur="1" fill="hold">
-                                          <p:stCondLst>
-                                            <p:cond delay="0"/>
-                                          </p:stCondLst>
-                                        </p:cTn>
-                                        <p:tgtEl>
-                                          <p:spTgt spid="3">
-                                            <p:txEl>
-                                              <p:pRg st="1" end="1"/>
-                                            </p:txEl>
-                                          </p:spTgt>
-                                        </p:tgtEl>
-                                        <p:attrNameLst>
-                                          <p:attrName>style.visibility</p:attrName>
-                                        </p:attrNameLst>
-                                      </p:cBhvr>
-                                      <p:to>
-                                        <p:strVal val="visible"/>
-                                      </p:to>
-                                    </p:set>
-                                  </p:childTnLst>
-                                </p:cTn>
-                              </p:par>
-                              <p:par>
-                                <p:cTn id="11" presetID="1" presetClass="entr" presetSubtype="0" fill="hold" grpId="0" nodeType="withEffect">
-                                  <p:stCondLst>
-                                    <p:cond delay="0"/>
-                                  </p:stCondLst>
-                                  <p:childTnLst>
-                                    <p:set>
-                                      <p:cBhvr>
-                                        <p:cTn id="12" dur="1" fill="hold">
-                                          <p:stCondLst>
-                                            <p:cond delay="0"/>
-                                          </p:stCondLst>
-                                        </p:cTn>
-                                        <p:tgtEl>
-                                          <p:spTgt spid="3">
-                                            <p:txEl>
-                                              <p:pRg st="2" end="2"/>
-                                            </p:txEl>
-                                          </p:spTgt>
-                                        </p:tgtEl>
-                                        <p:attrNameLst>
-                                          <p:attrName>style.visibility</p:attrName>
-                                        </p:attrNameLst>
-                                      </p:cBhvr>
-                                      <p:to>
-                                        <p:strVal val="visible"/>
-                                      </p:to>
-                                    </p:set>
-                                  </p:childTnLst>
-                                </p:cTn>
-                              </p:par>
-                              <p:par>
-                                <p:cTn id="13" presetID="1" presetClass="entr" presetSubtype="0" fill="hold" grpId="0" nodeType="withEffect">
-                                  <p:stCondLst>
-                                    <p:cond delay="0"/>
-                                  </p:stCondLst>
-                                  <p:childTnLst>
-                                    <p:set>
-                                      <p:cBhvr>
-                                        <p:cTn id="14" dur="1" fill="hold">
-                                          <p:stCondLst>
-                                            <p:cond delay="0"/>
-                                          </p:stCondLst>
-                                        </p:cTn>
-                                        <p:tgtEl>
-                                          <p:spTgt spid="3">
-                                            <p:txEl>
-                                              <p:pRg st="3" end="3"/>
-                                            </p:txEl>
-                                          </p:spTgt>
-                                        </p:tgtEl>
-                                        <p:attrNameLst>
-                                          <p:attrName>style.visibility</p:attrName>
-                                        </p:attrNameLst>
-                                      </p:cBhvr>
-                                      <p:to>
-                                        <p:strVal val="visible"/>
-                                      </p:to>
-                                    </p:set>
-                                  </p:childTnLst>
-                                </p:cTn>
-                              </p:par>
-                            </p:childTnLst>
-                          </p:cTn>
-                        </p:par>
-                      </p:childTnLst>
-                    </p:cTn>
-                  </p:par>
-                  <p:par>
-                    <p:cTn id="15" fill="hold">
-                      <p:stCondLst>
-                        <p:cond delay="indefinite"/>
-                      </p:stCondLst>
-                      <p:childTnLst>
-                        <p:par>
-                          <p:cTn id="16" fill="hold">
-                            <p:stCondLst>
-                              <p:cond delay="0"/>
-                            </p:stCondLst>
-                            <p:childTnLst>
-                              <p:par>
-                                <p:cTn id="17" presetID="1" presetClass="entr" presetSubtype="0" fill="hold" grpId="0" nodeType="clickEffect">
-                                  <p:stCondLst>
-                                    <p:cond delay="0"/>
-                                  </p:stCondLst>
-                                  <p:childTnLst>
-                                    <p:set>
-                                      <p:cBhvr>
-                                        <p:cTn id="18" dur="1" fill="hold">
-                                          <p:stCondLst>
-                                            <p:cond delay="0"/>
-                                          </p:stCondLst>
-                                        </p:cTn>
-                                        <p:tgtEl>
-                                          <p:spTgt spid="3">
-                                            <p:txEl>
-                                              <p:pRg st="4" end="4"/>
-                                            </p:txEl>
-                                          </p:spTgt>
-                                        </p:tgtEl>
-                                        <p:attrNameLst>
-                                          <p:attrName>style.visibility</p:attrName>
-                                        </p:attrNameLst>
-                                      </p:cBhvr>
-                                      <p:to>
-                                        <p:strVal val="visible"/>
-                                      </p:to>
-                                    </p:set>
-                                  </p:childTnLst>
-                                </p:cTn>
-                              </p:par>
-                              <p:par>
-                                <p:cTn id="19" presetID="1" presetClass="entr" presetSubtype="0" fill="hold" grpId="0" nodeType="withEffect">
-                                  <p:stCondLst>
-                                    <p:cond delay="0"/>
-                                  </p:stCondLst>
-                                  <p:childTnLst>
-                                    <p:set>
-                                      <p:cBhvr>
-                                        <p:cTn id="20" dur="1" fill="hold">
-                                          <p:stCondLst>
-                                            <p:cond delay="0"/>
-                                          </p:stCondLst>
-                                        </p:cTn>
-                                        <p:tgtEl>
-                                          <p:spTgt spid="3">
-                                            <p:txEl>
-                                              <p:pRg st="5" end="5"/>
-                                            </p:txEl>
-                                          </p:spTgt>
-                                        </p:tgtEl>
-                                        <p:attrNameLst>
-                                          <p:attrName>style.visibility</p:attrName>
-                                        </p:attrNameLst>
-                                      </p:cBhvr>
-                                      <p:to>
-                                        <p:strVal val="visible"/>
-                                      </p:to>
-                                    </p:set>
-                                  </p:childTnLst>
-                                </p:cTn>
-                              </p:par>
-                              <p:par>
-                                <p:cTn id="21" presetID="1" presetClass="entr" presetSubtype="0" fill="hold" grpId="0" nodeType="withEffect">
-                                  <p:stCondLst>
-                                    <p:cond delay="0"/>
-                                  </p:stCondLst>
-                                  <p:childTnLst>
-                                    <p:set>
-                                      <p:cBhvr>
-                                        <p:cTn id="22" dur="1" fill="hold">
-                                          <p:stCondLst>
-                                            <p:cond delay="0"/>
-                                          </p:stCondLst>
-                                        </p:cTn>
-                                        <p:tgtEl>
-                                          <p:spTgt spid="3">
-                                            <p:txEl>
-                                              <p:pRg st="6" end="6"/>
-                                            </p:txEl>
-                                          </p:spTgt>
-                                        </p:tgtEl>
-                                        <p:attrNameLst>
-                                          <p:attrName>style.visibility</p:attrName>
-                                        </p:attrNameLst>
-                                      </p:cBhvr>
-                                      <p:to>
-                                        <p:strVal val="visible"/>
-                                      </p:to>
-                                    </p:set>
-                                  </p:childTnLst>
-                                </p:cTn>
-                              </p:par>
-                            </p:childTnLst>
-                          </p:cTn>
-                        </p:par>
-                      </p:childTnLst>
-                    </p:cTn>
-                  </p:par>
-                  <p:par>
-                    <p:cTn id="23" fill="hold">
-                      <p:stCondLst>
-                        <p:cond delay="indefinite"/>
-                      </p:stCondLst>
-                      <p:childTnLst>
-                        <p:par>
-                          <p:cTn id="24" fill="hold">
-                            <p:stCondLst>
-                              <p:cond delay="0"/>
-                            </p:stCondLst>
-                            <p:childTnLst>
-                              <p:par>
-                                <p:cTn id="25" presetID="1" presetClass="entr" presetSubtype="0" fill="hold" nodeType="clickEffect">
-                                  <p:stCondLst>
-                                    <p:cond delay="0"/>
-                                  </p:stCondLst>
-                                  <p:childTnLst>
-                                    <p:set>
-                                      <p:cBhvr>
-                                        <p:cTn id="26" dur="1" fill="hold">
-                                          <p:stCondLst>
-                                            <p:cond delay="0"/>
-                                          </p:stCondLst>
-                                        </p:cTn>
-                                        <p:tgtEl>
-                                          <p:spTgt spid="4"/>
-                                        </p:tgtEl>
-                                        <p:attrNameLst>
-                                          <p:attrName>style.visibility</p:attrName>
-                                        </p:attrNameLst>
-                                      </p:cBhvr>
-                                      <p:to>
-                                        <p:strVal val="visible"/>
-                                      </p:to>
-                                    </p:set>
-                                  </p:childTnLst>
-                                </p:cTn>
-                              </p:par>
-                            </p:childTnLst>
-                          </p:cTn>
-                        </p:par>
-                      </p:childTnLst>
-                    </p:cTn>
-                  </p:par>
-                  <p:par>
-                    <p:cTn id="27" fill="hold">
-                      <p:stCondLst>
-                        <p:cond delay="indefinite"/>
-                      </p:stCondLst>
-                      <p:childTnLst>
-                        <p:par>
-                          <p:cTn id="28" fill="hold">
-                            <p:stCondLst>
-                              <p:cond delay="0"/>
-                            </p:stCondLst>
-                            <p:childTnLst>
-                              <p:par>
-                                <p:cTn id="29" presetID="1" presetClass="entr" presetSubtype="0" fill="hold" grpId="0" nodeType="clickEffect">
-                                  <p:stCondLst>
-                                    <p:cond delay="0"/>
-                                  </p:stCondLst>
-                                  <p:childTnLst>
-                                    <p:set>
-                                      <p:cBhvr>
-                                        <p:cTn id="30" dur="1" fill="hold">
-                                          <p:stCondLst>
-                                            <p:cond delay="0"/>
-                                          </p:stCondLst>
-                                        </p:cTn>
-                                        <p:tgtEl>
-                                          <p:spTgt spid="7"/>
-                                        </p:tgtEl>
-                                        <p:attrNameLst>
-                                          <p:attrName>style.visibility</p:attrName>
-                                        </p:attrNameLst>
-                                      </p:cBhvr>
-                                      <p:to>
-                                        <p:strVal val="visible"/>
-                                      </p:to>
-                                    </p:set>
-                                  </p:childTnLst>
-                                </p:cTn>
-                              </p:par>
-                            </p:childTnLst>
-                          </p:cTn>
-                        </p:par>
-                      </p:childTnLst>
-                    </p:cTn>
-                  </p:par>
-                </p:childTnLst>
-              </p:cTn>
-              <p:prevCondLst>
-                <p:cond evt="onPrev" delay="0">
-                  <p:tgtEl>
-                    <p:sldTgt/>
-                  </p:tgtEl>
-                </p:cond>
-              </p:prevCondLst>
-              <p:nextCondLst>
-                <p:cond evt="onNext" delay="0">
-                  <p:tgtEl>
-                    <p:sldTgt/>
-                  </p:tgtEl>
-                </p:cond>
-              </p:nextCondLst>
-            </p:seq>
-          </p:childTnLst>
-        </p:cTn>
-      </p:par>
-    </p:tnLst>
-    <p:bldLst>
-      <p:bldP spid="3" grpId="0" build="p"/>
-      <p:bldP spid="7" grpId="0" animBg="1"/>
-    </p:bldLst>
-  </p:timing>
-</p:sld>
-</file>
-
-<file path=ppt/slides/slide19.xml><?xml version="1.0" encoding="utf-8"?>
-<p:sld xmlns:a="http://schemas.openxmlformats.org/drawingml/2006/main" xmlns:r="http://schemas.openxmlformats.org/officeDocument/2006/relationships" xmlns:p="http://schemas.openxmlformats.org/presentationml/2006/main">
-  <p:cSld>
-    <p:spTree>
-      <p:nvGrpSpPr>
-        <p:cNvPr id="1" name=""/>
-        <p:cNvGrpSpPr/>
-        <p:nvPr/>
-      </p:nvGrpSpPr>
-      <p:grpSpPr>
-        <a:xfrm>
-          <a:off x="0" y="0"/>
-          <a:ext cx="0" cy="0"/>
-          <a:chOff x="0" y="0"/>
-          <a:chExt cx="0" cy="0"/>
-        </a:xfrm>
-      </p:grpSpPr>
-      <p:sp>
-        <p:nvSpPr>
-          <p:cNvPr id="2" name="Titel 1">
-            <a:extLst>
-              <a:ext uri="{FF2B5EF4-FFF2-40B4-BE49-F238E27FC236}">
-                <a16:creationId xmlns:a16="http://schemas.microsoft.com/office/drawing/2014/main" id="{7F46B4CD-99E5-4791-BC23-87E068CEEA00}"/>
-              </a:ext>
-            </a:extLst>
-          </p:cNvPr>
-          <p:cNvSpPr>
-            <a:spLocks noGrp="1"/>
-          </p:cNvSpPr>
-          <p:nvPr>
-            <p:ph type="title"/>
-          </p:nvPr>
-        </p:nvSpPr>
-        <p:spPr/>
-        <p:txBody>
-          <a:bodyPr/>
-          <a:lstStyle/>
-          <a:p>
-            <a:r>
-              <a:rPr lang="en-GB" dirty="0"/>
-              <a:t>Unit testing</a:t>
-            </a:r>
-          </a:p>
-        </p:txBody>
-      </p:sp>
-      <p:sp>
-        <p:nvSpPr>
-          <p:cNvPr id="3" name="Tijdelijke aanduiding voor inhoud 2">
-            <a:extLst>
-              <a:ext uri="{FF2B5EF4-FFF2-40B4-BE49-F238E27FC236}">
-                <a16:creationId xmlns:a16="http://schemas.microsoft.com/office/drawing/2014/main" id="{940F7FC2-2EF0-4D48-A4AC-D670BDAF16EC}"/>
-              </a:ext>
-            </a:extLst>
-          </p:cNvPr>
-          <p:cNvSpPr>
-            <a:spLocks noGrp="1"/>
-          </p:cNvSpPr>
-          <p:nvPr>
-            <p:ph idx="1"/>
-          </p:nvPr>
-        </p:nvSpPr>
-        <p:spPr/>
-        <p:txBody>
-          <a:bodyPr/>
-          <a:lstStyle/>
-          <a:p>
-            <a:r>
-              <a:rPr lang="en-GB" dirty="0" err="1"/>
-              <a:t>pytest</a:t>
-            </a:r>
-            <a:r>
-              <a:rPr lang="en-GB" dirty="0"/>
-              <a:t> package (</a:t>
-            </a:r>
-            <a:r>
-              <a:rPr lang="en-GB" dirty="0">
-                <a:hlinkClick r:id="rId2"/>
-              </a:rPr>
-              <a:t>https://docs.pytest.org/en/latest/</a:t>
-            </a:r>
-            <a:r>
-              <a:rPr lang="en-GB" dirty="0"/>
-              <a:t>)</a:t>
-            </a:r>
-          </a:p>
-          <a:p>
-            <a:r>
-              <a:rPr lang="en-GB" dirty="0"/>
-              <a:t>Test code on known input/output</a:t>
-            </a:r>
-          </a:p>
-          <a:p>
-            <a:r>
-              <a:rPr lang="en-GB" dirty="0"/>
-              <a:t>Automated testing</a:t>
-            </a:r>
-          </a:p>
-          <a:p>
-            <a:r>
-              <a:rPr lang="en-GB" dirty="0"/>
-              <a:t>Find errors early!</a:t>
-            </a:r>
-          </a:p>
-          <a:p>
-            <a:endParaRPr lang="en-GB" dirty="0"/>
-          </a:p>
-          <a:p>
-            <a:endParaRPr lang="en-GB" dirty="0"/>
-          </a:p>
-          <a:p>
-            <a:endParaRPr lang="en-GB" dirty="0"/>
-          </a:p>
-        </p:txBody>
-      </p:sp>
-    </p:spTree>
-    <p:extLst>
-      <p:ext uri="{BB962C8B-B14F-4D97-AF65-F5344CB8AC3E}">
-        <p14:creationId xmlns:p14="http://schemas.microsoft.com/office/powerpoint/2010/main" val="2977254317"/>
-      </p:ext>
-    </p:extLst>
-  </p:cSld>
-  <p:clrMapOvr>
-    <a:masterClrMapping/>
-  </p:clrMapOvr>
-</p:sld>
-</file>
-
 <file path=ppt/slides/slide2.xml><?xml version="1.0" encoding="utf-8"?>
 <p:sld xmlns:a="http://schemas.openxmlformats.org/drawingml/2006/main" xmlns:r="http://schemas.openxmlformats.org/officeDocument/2006/relationships" xmlns:p="http://schemas.openxmlformats.org/presentationml/2006/main">
   <p:cSld>
@@ -7053,1183 +6052,6 @@
     <p:extLst>
       <p:ext uri="{BB962C8B-B14F-4D97-AF65-F5344CB8AC3E}">
         <p14:creationId xmlns:p14="http://schemas.microsoft.com/office/powerpoint/2010/main" val="1156427390"/>
-      </p:ext>
-    </p:extLst>
-  </p:cSld>
-  <p:clrMapOvr>
-    <a:masterClrMapping/>
-  </p:clrMapOvr>
-</p:sld>
-</file>
-
-<file path=ppt/slides/slide20.xml><?xml version="1.0" encoding="utf-8"?>
-<p:sld xmlns:a="http://schemas.openxmlformats.org/drawingml/2006/main" xmlns:r="http://schemas.openxmlformats.org/officeDocument/2006/relationships" xmlns:p="http://schemas.openxmlformats.org/presentationml/2006/main">
-  <p:cSld>
-    <p:spTree>
-      <p:nvGrpSpPr>
-        <p:cNvPr id="1" name=""/>
-        <p:cNvGrpSpPr/>
-        <p:nvPr/>
-      </p:nvGrpSpPr>
-      <p:grpSpPr>
-        <a:xfrm>
-          <a:off x="0" y="0"/>
-          <a:ext cx="0" cy="0"/>
-          <a:chOff x="0" y="0"/>
-          <a:chExt cx="0" cy="0"/>
-        </a:xfrm>
-      </p:grpSpPr>
-      <p:sp>
-        <p:nvSpPr>
-          <p:cNvPr id="2" name="Title 1">
-            <a:extLst>
-              <a:ext uri="{FF2B5EF4-FFF2-40B4-BE49-F238E27FC236}">
-                <a16:creationId xmlns:a16="http://schemas.microsoft.com/office/drawing/2014/main" id="{3B73E158-2FD3-4A0A-82D6-1A3AF3EB831F}"/>
-              </a:ext>
-            </a:extLst>
-          </p:cNvPr>
-          <p:cNvSpPr>
-            <a:spLocks noGrp="1"/>
-          </p:cNvSpPr>
-          <p:nvPr>
-            <p:ph type="title"/>
-          </p:nvPr>
-        </p:nvSpPr>
-        <p:spPr/>
-        <p:txBody>
-          <a:bodyPr/>
-          <a:lstStyle/>
-          <a:p>
-            <a:r>
-              <a:rPr lang="en-GB" dirty="0"/>
-              <a:t>How to use </a:t>
-            </a:r>
-            <a:r>
-              <a:rPr lang="en-GB" dirty="0" err="1"/>
-              <a:t>pytest</a:t>
-            </a:r>
-            <a:endParaRPr lang="en-GB" dirty="0"/>
-          </a:p>
-        </p:txBody>
-      </p:sp>
-      <p:sp>
-        <p:nvSpPr>
-          <p:cNvPr id="3" name="Content Placeholder 2">
-            <a:extLst>
-              <a:ext uri="{FF2B5EF4-FFF2-40B4-BE49-F238E27FC236}">
-                <a16:creationId xmlns:a16="http://schemas.microsoft.com/office/drawing/2014/main" id="{EE309514-73AA-457A-928B-3B5B00793764}"/>
-              </a:ext>
-            </a:extLst>
-          </p:cNvPr>
-          <p:cNvSpPr>
-            <a:spLocks noGrp="1"/>
-          </p:cNvSpPr>
-          <p:nvPr>
-            <p:ph idx="1"/>
-          </p:nvPr>
-        </p:nvSpPr>
-        <p:spPr/>
-        <p:txBody>
-          <a:bodyPr/>
-          <a:lstStyle/>
-          <a:p>
-            <a:r>
-              <a:rPr lang="en-GB" dirty="0"/>
-              <a:t>Write test code in separate file called ‘test_{useful name}’</a:t>
-            </a:r>
-          </a:p>
-          <a:p>
-            <a:pPr lvl="1"/>
-            <a:r>
-              <a:rPr lang="en-GB" dirty="0"/>
-              <a:t>Call your function ‘test_{name of test}’</a:t>
-            </a:r>
-          </a:p>
-          <a:p>
-            <a:r>
-              <a:rPr lang="en-GB" dirty="0"/>
-              <a:t>Execute </a:t>
-            </a:r>
-            <a:r>
-              <a:rPr lang="en-GB" dirty="0" err="1"/>
-              <a:t>py.test</a:t>
-            </a:r>
-            <a:r>
-              <a:rPr lang="en-GB" dirty="0"/>
-              <a:t> in command line</a:t>
-            </a:r>
-          </a:p>
-          <a:p>
-            <a:pPr lvl="1"/>
-            <a:r>
-              <a:rPr lang="en-GB" dirty="0"/>
-              <a:t>This will execute all files that are called ‘test_{useful name}’ in the folder</a:t>
-            </a:r>
-          </a:p>
-          <a:p>
-            <a:r>
-              <a:rPr lang="en-GB" dirty="0"/>
-              <a:t>Use –k {name of test} to only try single test</a:t>
-            </a:r>
-          </a:p>
-          <a:p>
-            <a:r>
-              <a:rPr lang="en-GB" dirty="0"/>
-              <a:t>Use –v to get more information</a:t>
-            </a:r>
-          </a:p>
-          <a:p>
-            <a:endParaRPr lang="en-GB" dirty="0"/>
-          </a:p>
-        </p:txBody>
-      </p:sp>
-    </p:spTree>
-    <p:extLst>
-      <p:ext uri="{BB962C8B-B14F-4D97-AF65-F5344CB8AC3E}">
-        <p14:creationId xmlns:p14="http://schemas.microsoft.com/office/powerpoint/2010/main" val="2417442756"/>
-      </p:ext>
-    </p:extLst>
-  </p:cSld>
-  <p:clrMapOvr>
-    <a:masterClrMapping/>
-  </p:clrMapOvr>
-</p:sld>
-</file>
-
-<file path=ppt/slides/slide21.xml><?xml version="1.0" encoding="utf-8"?>
-<p:sld xmlns:a="http://schemas.openxmlformats.org/drawingml/2006/main" xmlns:r="http://schemas.openxmlformats.org/officeDocument/2006/relationships" xmlns:p="http://schemas.openxmlformats.org/presentationml/2006/main">
-  <p:cSld>
-    <p:spTree>
-      <p:nvGrpSpPr>
-        <p:cNvPr id="1" name=""/>
-        <p:cNvGrpSpPr/>
-        <p:nvPr/>
-      </p:nvGrpSpPr>
-      <p:grpSpPr>
-        <a:xfrm>
-          <a:off x="0" y="0"/>
-          <a:ext cx="0" cy="0"/>
-          <a:chOff x="0" y="0"/>
-          <a:chExt cx="0" cy="0"/>
-        </a:xfrm>
-      </p:grpSpPr>
-      <p:sp>
-        <p:nvSpPr>
-          <p:cNvPr id="2" name="Titel 1">
-            <a:extLst>
-              <a:ext uri="{FF2B5EF4-FFF2-40B4-BE49-F238E27FC236}">
-                <a16:creationId xmlns:a16="http://schemas.microsoft.com/office/drawing/2014/main" id="{F39D9561-E4CB-4DC8-89E1-FDBE640304D0}"/>
-              </a:ext>
-            </a:extLst>
-          </p:cNvPr>
-          <p:cNvSpPr>
-            <a:spLocks noGrp="1"/>
-          </p:cNvSpPr>
-          <p:nvPr>
-            <p:ph type="title"/>
-          </p:nvPr>
-        </p:nvSpPr>
-        <p:spPr/>
-        <p:txBody>
-          <a:bodyPr/>
-          <a:lstStyle/>
-          <a:p>
-            <a:r>
-              <a:rPr lang="en-GB" dirty="0"/>
-              <a:t>When to use it?</a:t>
-            </a:r>
-          </a:p>
-        </p:txBody>
-      </p:sp>
-      <p:sp>
-        <p:nvSpPr>
-          <p:cNvPr id="3" name="Tijdelijke aanduiding voor inhoud 2">
-            <a:extLst>
-              <a:ext uri="{FF2B5EF4-FFF2-40B4-BE49-F238E27FC236}">
-                <a16:creationId xmlns:a16="http://schemas.microsoft.com/office/drawing/2014/main" id="{9A1EB161-4D87-4DC5-9D8A-5371D42248BA}"/>
-              </a:ext>
-            </a:extLst>
-          </p:cNvPr>
-          <p:cNvSpPr>
-            <a:spLocks noGrp="1"/>
-          </p:cNvSpPr>
-          <p:nvPr>
-            <p:ph idx="1"/>
-          </p:nvPr>
-        </p:nvSpPr>
-        <p:spPr/>
-        <p:txBody>
-          <a:bodyPr/>
-          <a:lstStyle/>
-          <a:p>
-            <a:r>
-              <a:rPr lang="en-GB" dirty="0"/>
-              <a:t>While writing a function</a:t>
-            </a:r>
-          </a:p>
-          <a:p>
-            <a:r>
-              <a:rPr lang="en-GB" dirty="0"/>
-              <a:t>Divide functions into units</a:t>
-            </a:r>
-          </a:p>
-          <a:p>
-            <a:r>
-              <a:rPr lang="en-GB" dirty="0"/>
-              <a:t>Larger functions -&gt; Create mock data</a:t>
-            </a:r>
-          </a:p>
-        </p:txBody>
-      </p:sp>
-    </p:spTree>
-    <p:extLst>
-      <p:ext uri="{BB962C8B-B14F-4D97-AF65-F5344CB8AC3E}">
-        <p14:creationId xmlns:p14="http://schemas.microsoft.com/office/powerpoint/2010/main" val="1166889151"/>
-      </p:ext>
-    </p:extLst>
-  </p:cSld>
-  <p:clrMapOvr>
-    <a:masterClrMapping/>
-  </p:clrMapOvr>
-</p:sld>
-</file>
-
-<file path=ppt/slides/slide22.xml><?xml version="1.0" encoding="utf-8"?>
-<p:sld xmlns:a="http://schemas.openxmlformats.org/drawingml/2006/main" xmlns:r="http://schemas.openxmlformats.org/officeDocument/2006/relationships" xmlns:p="http://schemas.openxmlformats.org/presentationml/2006/main">
-  <p:cSld>
-    <p:spTree>
-      <p:nvGrpSpPr>
-        <p:cNvPr id="1" name=""/>
-        <p:cNvGrpSpPr/>
-        <p:nvPr/>
-      </p:nvGrpSpPr>
-      <p:grpSpPr>
-        <a:xfrm>
-          <a:off x="0" y="0"/>
-          <a:ext cx="0" cy="0"/>
-          <a:chOff x="0" y="0"/>
-          <a:chExt cx="0" cy="0"/>
-        </a:xfrm>
-      </p:grpSpPr>
-      <p:sp>
-        <p:nvSpPr>
-          <p:cNvPr id="2" name="Titel 1">
-            <a:extLst>
-              <a:ext uri="{FF2B5EF4-FFF2-40B4-BE49-F238E27FC236}">
-                <a16:creationId xmlns:a16="http://schemas.microsoft.com/office/drawing/2014/main" id="{D95A053D-3E99-473A-A8E0-AD5812CE1367}"/>
-              </a:ext>
-            </a:extLst>
-          </p:cNvPr>
-          <p:cNvSpPr>
-            <a:spLocks noGrp="1"/>
-          </p:cNvSpPr>
-          <p:nvPr>
-            <p:ph type="title"/>
-          </p:nvPr>
-        </p:nvSpPr>
-        <p:spPr/>
-        <p:txBody>
-          <a:bodyPr/>
-          <a:lstStyle/>
-          <a:p>
-            <a:r>
-              <a:rPr lang="en-GB" dirty="0"/>
-              <a:t>Example</a:t>
-            </a:r>
-          </a:p>
-        </p:txBody>
-      </p:sp>
-      <p:sp>
-        <p:nvSpPr>
-          <p:cNvPr id="3" name="Tijdelijke aanduiding voor inhoud 2">
-            <a:extLst>
-              <a:ext uri="{FF2B5EF4-FFF2-40B4-BE49-F238E27FC236}">
-                <a16:creationId xmlns:a16="http://schemas.microsoft.com/office/drawing/2014/main" id="{BB78B12A-7950-4EF2-AE75-83F7C80A1610}"/>
-              </a:ext>
-            </a:extLst>
-          </p:cNvPr>
-          <p:cNvSpPr>
-            <a:spLocks noGrp="1"/>
-          </p:cNvSpPr>
-          <p:nvPr>
-            <p:ph idx="1"/>
-          </p:nvPr>
-        </p:nvSpPr>
-        <p:spPr/>
-        <p:txBody>
-          <a:bodyPr/>
-          <a:lstStyle/>
-          <a:p>
-            <a:r>
-              <a:rPr lang="en-GB" dirty="0"/>
-              <a:t>Write a program that takes a number n as input, and calculates the sum of all numbers 1 to n. </a:t>
-            </a:r>
-          </a:p>
-          <a:p>
-            <a:r>
-              <a:rPr lang="en-GB" dirty="0"/>
-              <a:t>Workflow</a:t>
-            </a:r>
-          </a:p>
-          <a:p>
-            <a:pPr lvl="1"/>
-            <a:r>
-              <a:rPr lang="en-GB" dirty="0"/>
-              <a:t>Write test cases</a:t>
-            </a:r>
-          </a:p>
-          <a:p>
-            <a:pPr lvl="1"/>
-            <a:r>
-              <a:rPr lang="en-GB" dirty="0"/>
-              <a:t>Write function</a:t>
-            </a:r>
-          </a:p>
-          <a:p>
-            <a:pPr lvl="1"/>
-            <a:r>
-              <a:rPr lang="en-GB" dirty="0"/>
-              <a:t>Test function</a:t>
-            </a:r>
-          </a:p>
-        </p:txBody>
-      </p:sp>
-    </p:spTree>
-    <p:extLst>
-      <p:ext uri="{BB962C8B-B14F-4D97-AF65-F5344CB8AC3E}">
-        <p14:creationId xmlns:p14="http://schemas.microsoft.com/office/powerpoint/2010/main" val="1262934848"/>
-      </p:ext>
-    </p:extLst>
-  </p:cSld>
-  <p:clrMapOvr>
-    <a:masterClrMapping/>
-  </p:clrMapOvr>
-</p:sld>
-</file>
-
-<file path=ppt/slides/slide23.xml><?xml version="1.0" encoding="utf-8"?>
-<p:sld xmlns:a="http://schemas.openxmlformats.org/drawingml/2006/main" xmlns:r="http://schemas.openxmlformats.org/officeDocument/2006/relationships" xmlns:p="http://schemas.openxmlformats.org/presentationml/2006/main">
-  <p:cSld>
-    <p:spTree>
-      <p:nvGrpSpPr>
-        <p:cNvPr id="1" name=""/>
-        <p:cNvGrpSpPr/>
-        <p:nvPr/>
-      </p:nvGrpSpPr>
-      <p:grpSpPr>
-        <a:xfrm>
-          <a:off x="0" y="0"/>
-          <a:ext cx="0" cy="0"/>
-          <a:chOff x="0" y="0"/>
-          <a:chExt cx="0" cy="0"/>
-        </a:xfrm>
-      </p:grpSpPr>
-      <p:sp>
-        <p:nvSpPr>
-          <p:cNvPr id="2" name="Titel 1">
-            <a:extLst>
-              <a:ext uri="{FF2B5EF4-FFF2-40B4-BE49-F238E27FC236}">
-                <a16:creationId xmlns:a16="http://schemas.microsoft.com/office/drawing/2014/main" id="{924F00DC-26ED-4C27-AC84-362B43B01E17}"/>
-              </a:ext>
-            </a:extLst>
-          </p:cNvPr>
-          <p:cNvSpPr>
-            <a:spLocks noGrp="1"/>
-          </p:cNvSpPr>
-          <p:nvPr>
-            <p:ph type="title"/>
-          </p:nvPr>
-        </p:nvSpPr>
-        <p:spPr/>
-        <p:txBody>
-          <a:bodyPr/>
-          <a:lstStyle/>
-          <a:p>
-            <a:r>
-              <a:rPr lang="en-GB" dirty="0"/>
-              <a:t>Writing test cases</a:t>
-            </a:r>
-          </a:p>
-        </p:txBody>
-      </p:sp>
-      <p:sp>
-        <p:nvSpPr>
-          <p:cNvPr id="3" name="Tijdelijke aanduiding voor inhoud 2">
-            <a:extLst>
-              <a:ext uri="{FF2B5EF4-FFF2-40B4-BE49-F238E27FC236}">
-                <a16:creationId xmlns:a16="http://schemas.microsoft.com/office/drawing/2014/main" id="{DA8A539B-D511-4AA0-94CF-71575B4ED934}"/>
-              </a:ext>
-            </a:extLst>
-          </p:cNvPr>
-          <p:cNvSpPr>
-            <a:spLocks noGrp="1"/>
-          </p:cNvSpPr>
-          <p:nvPr>
-            <p:ph idx="1"/>
-          </p:nvPr>
-        </p:nvSpPr>
-        <p:spPr/>
-        <p:txBody>
-          <a:bodyPr/>
-          <a:lstStyle/>
-          <a:p>
-            <a:r>
-              <a:rPr lang="en-GB" dirty="0"/>
-              <a:t>Standard cases</a:t>
-            </a:r>
-          </a:p>
-          <a:p>
-            <a:pPr lvl="1"/>
-            <a:r>
-              <a:rPr lang="en-GB" dirty="0"/>
-              <a:t>Empty input</a:t>
-            </a:r>
-          </a:p>
-          <a:p>
-            <a:pPr lvl="1"/>
-            <a:r>
-              <a:rPr lang="en-GB" dirty="0"/>
-              <a:t>Input wrong type (e.g. String)</a:t>
-            </a:r>
-          </a:p>
-          <a:p>
-            <a:r>
-              <a:rPr lang="en-GB" dirty="0"/>
-              <a:t>Useful cases</a:t>
-            </a:r>
-          </a:p>
-          <a:p>
-            <a:pPr lvl="1"/>
-            <a:r>
-              <a:rPr lang="en-GB" dirty="0"/>
-              <a:t>N &lt; 0</a:t>
-            </a:r>
-          </a:p>
-          <a:p>
-            <a:pPr lvl="1"/>
-            <a:r>
-              <a:rPr lang="en-GB" dirty="0"/>
-              <a:t>N = 0</a:t>
-            </a:r>
-          </a:p>
-          <a:p>
-            <a:pPr lvl="1"/>
-            <a:r>
-              <a:rPr lang="en-GB" dirty="0"/>
-              <a:t>N &gt; 0</a:t>
-            </a:r>
-          </a:p>
-        </p:txBody>
-      </p:sp>
-    </p:spTree>
-    <p:extLst>
-      <p:ext uri="{BB962C8B-B14F-4D97-AF65-F5344CB8AC3E}">
-        <p14:creationId xmlns:p14="http://schemas.microsoft.com/office/powerpoint/2010/main" val="28775106"/>
-      </p:ext>
-    </p:extLst>
-  </p:cSld>
-  <p:clrMapOvr>
-    <a:masterClrMapping/>
-  </p:clrMapOvr>
-  <p:timing>
-    <p:tnLst>
-      <p:par>
-        <p:cTn id="1" dur="indefinite" restart="never" nodeType="tmRoot">
-          <p:childTnLst>
-            <p:seq concurrent="1" nextAc="seek">
-              <p:cTn id="2" dur="indefinite" nodeType="mainSeq">
-                <p:childTnLst>
-                  <p:par>
-                    <p:cTn id="3" fill="hold">
-                      <p:stCondLst>
-                        <p:cond delay="indefinite"/>
-                      </p:stCondLst>
-                      <p:childTnLst>
-                        <p:par>
-                          <p:cTn id="4" fill="hold">
-                            <p:stCondLst>
-                              <p:cond delay="0"/>
-                            </p:stCondLst>
-                            <p:childTnLst>
-                              <p:par>
-                                <p:cTn id="5" presetID="1" presetClass="entr" presetSubtype="0" fill="hold" grpId="0" nodeType="clickEffect">
-                                  <p:stCondLst>
-                                    <p:cond delay="0"/>
-                                  </p:stCondLst>
-                                  <p:childTnLst>
-                                    <p:set>
-                                      <p:cBhvr>
-                                        <p:cTn id="6" dur="1" fill="hold">
-                                          <p:stCondLst>
-                                            <p:cond delay="0"/>
-                                          </p:stCondLst>
-                                        </p:cTn>
-                                        <p:tgtEl>
-                                          <p:spTgt spid="3">
-                                            <p:txEl>
-                                              <p:pRg st="0" end="0"/>
-                                            </p:txEl>
-                                          </p:spTgt>
-                                        </p:tgtEl>
-                                        <p:attrNameLst>
-                                          <p:attrName>style.visibility</p:attrName>
-                                        </p:attrNameLst>
-                                      </p:cBhvr>
-                                      <p:to>
-                                        <p:strVal val="visible"/>
-                                      </p:to>
-                                    </p:set>
-                                  </p:childTnLst>
-                                </p:cTn>
-                              </p:par>
-                              <p:par>
-                                <p:cTn id="7" presetID="1" presetClass="entr" presetSubtype="0" fill="hold" grpId="0" nodeType="withEffect">
-                                  <p:stCondLst>
-                                    <p:cond delay="0"/>
-                                  </p:stCondLst>
-                                  <p:childTnLst>
-                                    <p:set>
-                                      <p:cBhvr>
-                                        <p:cTn id="8" dur="1" fill="hold">
-                                          <p:stCondLst>
-                                            <p:cond delay="0"/>
-                                          </p:stCondLst>
-                                        </p:cTn>
-                                        <p:tgtEl>
-                                          <p:spTgt spid="3">
-                                            <p:txEl>
-                                              <p:pRg st="1" end="1"/>
-                                            </p:txEl>
-                                          </p:spTgt>
-                                        </p:tgtEl>
-                                        <p:attrNameLst>
-                                          <p:attrName>style.visibility</p:attrName>
-                                        </p:attrNameLst>
-                                      </p:cBhvr>
-                                      <p:to>
-                                        <p:strVal val="visible"/>
-                                      </p:to>
-                                    </p:set>
-                                  </p:childTnLst>
-                                </p:cTn>
-                              </p:par>
-                              <p:par>
-                                <p:cTn id="9" presetID="1" presetClass="entr" presetSubtype="0" fill="hold" grpId="0" nodeType="withEffect">
-                                  <p:stCondLst>
-                                    <p:cond delay="0"/>
-                                  </p:stCondLst>
-                                  <p:childTnLst>
-                                    <p:set>
-                                      <p:cBhvr>
-                                        <p:cTn id="10" dur="1" fill="hold">
-                                          <p:stCondLst>
-                                            <p:cond delay="0"/>
-                                          </p:stCondLst>
-                                        </p:cTn>
-                                        <p:tgtEl>
-                                          <p:spTgt spid="3">
-                                            <p:txEl>
-                                              <p:pRg st="2" end="2"/>
-                                            </p:txEl>
-                                          </p:spTgt>
-                                        </p:tgtEl>
-                                        <p:attrNameLst>
-                                          <p:attrName>style.visibility</p:attrName>
-                                        </p:attrNameLst>
-                                      </p:cBhvr>
-                                      <p:to>
-                                        <p:strVal val="visible"/>
-                                      </p:to>
-                                    </p:set>
-                                  </p:childTnLst>
-                                </p:cTn>
-                              </p:par>
-                            </p:childTnLst>
-                          </p:cTn>
-                        </p:par>
-                      </p:childTnLst>
-                    </p:cTn>
-                  </p:par>
-                  <p:par>
-                    <p:cTn id="11" fill="hold">
-                      <p:stCondLst>
-                        <p:cond delay="indefinite"/>
-                      </p:stCondLst>
-                      <p:childTnLst>
-                        <p:par>
-                          <p:cTn id="12" fill="hold">
-                            <p:stCondLst>
-                              <p:cond delay="0"/>
-                            </p:stCondLst>
-                            <p:childTnLst>
-                              <p:par>
-                                <p:cTn id="13" presetID="1" presetClass="entr" presetSubtype="0" fill="hold" grpId="0" nodeType="clickEffect">
-                                  <p:stCondLst>
-                                    <p:cond delay="0"/>
-                                  </p:stCondLst>
-                                  <p:childTnLst>
-                                    <p:set>
-                                      <p:cBhvr>
-                                        <p:cTn id="14" dur="1" fill="hold">
-                                          <p:stCondLst>
-                                            <p:cond delay="0"/>
-                                          </p:stCondLst>
-                                        </p:cTn>
-                                        <p:tgtEl>
-                                          <p:spTgt spid="3">
-                                            <p:txEl>
-                                              <p:pRg st="3" end="3"/>
-                                            </p:txEl>
-                                          </p:spTgt>
-                                        </p:tgtEl>
-                                        <p:attrNameLst>
-                                          <p:attrName>style.visibility</p:attrName>
-                                        </p:attrNameLst>
-                                      </p:cBhvr>
-                                      <p:to>
-                                        <p:strVal val="visible"/>
-                                      </p:to>
-                                    </p:set>
-                                  </p:childTnLst>
-                                </p:cTn>
-                              </p:par>
-                              <p:par>
-                                <p:cTn id="15" presetID="1" presetClass="entr" presetSubtype="0" fill="hold" grpId="0" nodeType="withEffect">
-                                  <p:stCondLst>
-                                    <p:cond delay="0"/>
-                                  </p:stCondLst>
-                                  <p:childTnLst>
-                                    <p:set>
-                                      <p:cBhvr>
-                                        <p:cTn id="16" dur="1" fill="hold">
-                                          <p:stCondLst>
-                                            <p:cond delay="0"/>
-                                          </p:stCondLst>
-                                        </p:cTn>
-                                        <p:tgtEl>
-                                          <p:spTgt spid="3">
-                                            <p:txEl>
-                                              <p:pRg st="4" end="4"/>
-                                            </p:txEl>
-                                          </p:spTgt>
-                                        </p:tgtEl>
-                                        <p:attrNameLst>
-                                          <p:attrName>style.visibility</p:attrName>
-                                        </p:attrNameLst>
-                                      </p:cBhvr>
-                                      <p:to>
-                                        <p:strVal val="visible"/>
-                                      </p:to>
-                                    </p:set>
-                                  </p:childTnLst>
-                                </p:cTn>
-                              </p:par>
-                              <p:par>
-                                <p:cTn id="17" presetID="1" presetClass="entr" presetSubtype="0" fill="hold" grpId="0" nodeType="withEffect">
-                                  <p:stCondLst>
-                                    <p:cond delay="0"/>
-                                  </p:stCondLst>
-                                  <p:childTnLst>
-                                    <p:set>
-                                      <p:cBhvr>
-                                        <p:cTn id="18" dur="1" fill="hold">
-                                          <p:stCondLst>
-                                            <p:cond delay="0"/>
-                                          </p:stCondLst>
-                                        </p:cTn>
-                                        <p:tgtEl>
-                                          <p:spTgt spid="3">
-                                            <p:txEl>
-                                              <p:pRg st="5" end="5"/>
-                                            </p:txEl>
-                                          </p:spTgt>
-                                        </p:tgtEl>
-                                        <p:attrNameLst>
-                                          <p:attrName>style.visibility</p:attrName>
-                                        </p:attrNameLst>
-                                      </p:cBhvr>
-                                      <p:to>
-                                        <p:strVal val="visible"/>
-                                      </p:to>
-                                    </p:set>
-                                  </p:childTnLst>
-                                </p:cTn>
-                              </p:par>
-                              <p:par>
-                                <p:cTn id="19" presetID="1" presetClass="entr" presetSubtype="0" fill="hold" grpId="0" nodeType="withEffect">
-                                  <p:stCondLst>
-                                    <p:cond delay="0"/>
-                                  </p:stCondLst>
-                                  <p:childTnLst>
-                                    <p:set>
-                                      <p:cBhvr>
-                                        <p:cTn id="20" dur="1" fill="hold">
-                                          <p:stCondLst>
-                                            <p:cond delay="0"/>
-                                          </p:stCondLst>
-                                        </p:cTn>
-                                        <p:tgtEl>
-                                          <p:spTgt spid="3">
-                                            <p:txEl>
-                                              <p:pRg st="6" end="6"/>
-                                            </p:txEl>
-                                          </p:spTgt>
-                                        </p:tgtEl>
-                                        <p:attrNameLst>
-                                          <p:attrName>style.visibility</p:attrName>
-                                        </p:attrNameLst>
-                                      </p:cBhvr>
-                                      <p:to>
-                                        <p:strVal val="visible"/>
-                                      </p:to>
-                                    </p:set>
-                                  </p:childTnLst>
-                                </p:cTn>
-                              </p:par>
-                            </p:childTnLst>
-                          </p:cTn>
-                        </p:par>
-                      </p:childTnLst>
-                    </p:cTn>
-                  </p:par>
-                </p:childTnLst>
-              </p:cTn>
-              <p:prevCondLst>
-                <p:cond evt="onPrev" delay="0">
-                  <p:tgtEl>
-                    <p:sldTgt/>
-                  </p:tgtEl>
-                </p:cond>
-              </p:prevCondLst>
-              <p:nextCondLst>
-                <p:cond evt="onNext" delay="0">
-                  <p:tgtEl>
-                    <p:sldTgt/>
-                  </p:tgtEl>
-                </p:cond>
-              </p:nextCondLst>
-            </p:seq>
-          </p:childTnLst>
-        </p:cTn>
-      </p:par>
-    </p:tnLst>
-    <p:bldLst>
-      <p:bldP spid="3" grpId="0" build="p"/>
-    </p:bldLst>
-  </p:timing>
-</p:sld>
-</file>
-
-<file path=ppt/slides/slide24.xml><?xml version="1.0" encoding="utf-8"?>
-<p:sld xmlns:a="http://schemas.openxmlformats.org/drawingml/2006/main" xmlns:r="http://schemas.openxmlformats.org/officeDocument/2006/relationships" xmlns:p="http://schemas.openxmlformats.org/presentationml/2006/main">
-  <p:cSld>
-    <p:spTree>
-      <p:nvGrpSpPr>
-        <p:cNvPr id="1" name=""/>
-        <p:cNvGrpSpPr/>
-        <p:nvPr/>
-      </p:nvGrpSpPr>
-      <p:grpSpPr>
-        <a:xfrm>
-          <a:off x="0" y="0"/>
-          <a:ext cx="0" cy="0"/>
-          <a:chOff x="0" y="0"/>
-          <a:chExt cx="0" cy="0"/>
-        </a:xfrm>
-      </p:grpSpPr>
-      <p:pic>
-        <p:nvPicPr>
-          <p:cNvPr id="6" name="Afbeelding 5">
-            <a:extLst>
-              <a:ext uri="{FF2B5EF4-FFF2-40B4-BE49-F238E27FC236}">
-                <a16:creationId xmlns:a16="http://schemas.microsoft.com/office/drawing/2014/main" id="{5A4D9352-4A1C-4C9A-9388-1D851E5935CA}"/>
-              </a:ext>
-            </a:extLst>
-          </p:cNvPr>
-          <p:cNvPicPr>
-            <a:picLocks noChangeAspect="1"/>
-          </p:cNvPicPr>
-          <p:nvPr/>
-        </p:nvPicPr>
-        <p:blipFill>
-          <a:blip r:embed="rId2"/>
-          <a:stretch>
-            <a:fillRect/>
-          </a:stretch>
-        </p:blipFill>
-        <p:spPr>
-          <a:xfrm>
-            <a:off x="2034539" y="0"/>
-            <a:ext cx="8031561" cy="6858000"/>
-          </a:xfrm>
-          <a:prstGeom prst="rect">
-            <a:avLst/>
-          </a:prstGeom>
-        </p:spPr>
-      </p:pic>
-    </p:spTree>
-    <p:extLst>
-      <p:ext uri="{BB962C8B-B14F-4D97-AF65-F5344CB8AC3E}">
-        <p14:creationId xmlns:p14="http://schemas.microsoft.com/office/powerpoint/2010/main" val="87156183"/>
-      </p:ext>
-    </p:extLst>
-  </p:cSld>
-  <p:clrMapOvr>
-    <a:masterClrMapping/>
-  </p:clrMapOvr>
-</p:sld>
-</file>
-
-<file path=ppt/slides/slide25.xml><?xml version="1.0" encoding="utf-8"?>
-<p:sld xmlns:a="http://schemas.openxmlformats.org/drawingml/2006/main" xmlns:r="http://schemas.openxmlformats.org/officeDocument/2006/relationships" xmlns:p="http://schemas.openxmlformats.org/presentationml/2006/main">
-  <p:cSld>
-    <p:spTree>
-      <p:nvGrpSpPr>
-        <p:cNvPr id="1" name=""/>
-        <p:cNvGrpSpPr/>
-        <p:nvPr/>
-      </p:nvGrpSpPr>
-      <p:grpSpPr>
-        <a:xfrm>
-          <a:off x="0" y="0"/>
-          <a:ext cx="0" cy="0"/>
-          <a:chOff x="0" y="0"/>
-          <a:chExt cx="0" cy="0"/>
-        </a:xfrm>
-      </p:grpSpPr>
-      <p:pic>
-        <p:nvPicPr>
-          <p:cNvPr id="8" name="Afbeelding 7">
-            <a:extLst>
-              <a:ext uri="{FF2B5EF4-FFF2-40B4-BE49-F238E27FC236}">
-                <a16:creationId xmlns:a16="http://schemas.microsoft.com/office/drawing/2014/main" id="{04A87A8B-D837-4912-B466-33BA593AF7DA}"/>
-              </a:ext>
-            </a:extLst>
-          </p:cNvPr>
-          <p:cNvPicPr>
-            <a:picLocks noChangeAspect="1"/>
-          </p:cNvPicPr>
-          <p:nvPr/>
-        </p:nvPicPr>
-        <p:blipFill>
-          <a:blip r:embed="rId2"/>
-          <a:stretch>
-            <a:fillRect/>
-          </a:stretch>
-        </p:blipFill>
-        <p:spPr>
-          <a:xfrm>
-            <a:off x="-1" y="0"/>
-            <a:ext cx="7723573" cy="6858000"/>
-          </a:xfrm>
-          <a:prstGeom prst="rect">
-            <a:avLst/>
-          </a:prstGeom>
-        </p:spPr>
-      </p:pic>
-      <p:pic>
-        <p:nvPicPr>
-          <p:cNvPr id="7" name="Afbeelding 6">
-            <a:extLst>
-              <a:ext uri="{FF2B5EF4-FFF2-40B4-BE49-F238E27FC236}">
-                <a16:creationId xmlns:a16="http://schemas.microsoft.com/office/drawing/2014/main" id="{CAE51E97-110B-431A-BF12-1757658189C4}"/>
-              </a:ext>
-            </a:extLst>
-          </p:cNvPr>
-          <p:cNvPicPr>
-            <a:picLocks noChangeAspect="1"/>
-          </p:cNvPicPr>
-          <p:nvPr/>
-        </p:nvPicPr>
-        <p:blipFill rotWithShape="1">
-          <a:blip r:embed="rId3"/>
-          <a:srcRect t="28537"/>
-          <a:stretch/>
-        </p:blipFill>
-        <p:spPr>
-          <a:xfrm>
-            <a:off x="6812279" y="2037356"/>
-            <a:ext cx="5539823" cy="3380463"/>
-          </a:xfrm>
-          <a:prstGeom prst="rect">
-            <a:avLst/>
-          </a:prstGeom>
-        </p:spPr>
-      </p:pic>
-    </p:spTree>
-    <p:extLst>
-      <p:ext uri="{BB962C8B-B14F-4D97-AF65-F5344CB8AC3E}">
-        <p14:creationId xmlns:p14="http://schemas.microsoft.com/office/powerpoint/2010/main" val="423768292"/>
-      </p:ext>
-    </p:extLst>
-  </p:cSld>
-  <p:clrMapOvr>
-    <a:masterClrMapping/>
-  </p:clrMapOvr>
-</p:sld>
-</file>
-
-<file path=ppt/slides/slide26.xml><?xml version="1.0" encoding="utf-8"?>
-<p:sld xmlns:a="http://schemas.openxmlformats.org/drawingml/2006/main" xmlns:r="http://schemas.openxmlformats.org/officeDocument/2006/relationships" xmlns:p="http://schemas.openxmlformats.org/presentationml/2006/main">
-  <p:cSld>
-    <p:spTree>
-      <p:nvGrpSpPr>
-        <p:cNvPr id="1" name=""/>
-        <p:cNvGrpSpPr/>
-        <p:nvPr/>
-      </p:nvGrpSpPr>
-      <p:grpSpPr>
-        <a:xfrm>
-          <a:off x="0" y="0"/>
-          <a:ext cx="0" cy="0"/>
-          <a:chOff x="0" y="0"/>
-          <a:chExt cx="0" cy="0"/>
-        </a:xfrm>
-      </p:grpSpPr>
-      <p:pic>
-        <p:nvPicPr>
-          <p:cNvPr id="4" name="Afbeelding 3">
-            <a:extLst>
-              <a:ext uri="{FF2B5EF4-FFF2-40B4-BE49-F238E27FC236}">
-                <a16:creationId xmlns:a16="http://schemas.microsoft.com/office/drawing/2014/main" id="{DF92E490-A18C-464F-97C7-7BF793B1410E}"/>
-              </a:ext>
-            </a:extLst>
-          </p:cNvPr>
-          <p:cNvPicPr>
-            <a:picLocks noChangeAspect="1"/>
-          </p:cNvPicPr>
-          <p:nvPr/>
-        </p:nvPicPr>
-        <p:blipFill>
-          <a:blip r:embed="rId2"/>
-          <a:stretch>
-            <a:fillRect/>
-          </a:stretch>
-        </p:blipFill>
-        <p:spPr>
-          <a:xfrm>
-            <a:off x="1" y="0"/>
-            <a:ext cx="6697980" cy="3586449"/>
-          </a:xfrm>
-          <a:prstGeom prst="rect">
-            <a:avLst/>
-          </a:prstGeom>
-        </p:spPr>
-      </p:pic>
-      <p:pic>
-        <p:nvPicPr>
-          <p:cNvPr id="5" name="Afbeelding 4">
-            <a:extLst>
-              <a:ext uri="{FF2B5EF4-FFF2-40B4-BE49-F238E27FC236}">
-                <a16:creationId xmlns:a16="http://schemas.microsoft.com/office/drawing/2014/main" id="{53470DA0-2C1F-44A4-B40E-464B8DC22E8F}"/>
-              </a:ext>
-            </a:extLst>
-          </p:cNvPr>
-          <p:cNvPicPr>
-            <a:picLocks noChangeAspect="1"/>
-          </p:cNvPicPr>
-          <p:nvPr/>
-        </p:nvPicPr>
-        <p:blipFill>
-          <a:blip r:embed="rId3"/>
-          <a:stretch>
-            <a:fillRect/>
-          </a:stretch>
-        </p:blipFill>
-        <p:spPr>
-          <a:xfrm>
-            <a:off x="3199282" y="3284220"/>
-            <a:ext cx="8992718" cy="3573780"/>
-          </a:xfrm>
-          <a:prstGeom prst="rect">
-            <a:avLst/>
-          </a:prstGeom>
-        </p:spPr>
-      </p:pic>
-    </p:spTree>
-    <p:extLst>
-      <p:ext uri="{BB962C8B-B14F-4D97-AF65-F5344CB8AC3E}">
-        <p14:creationId xmlns:p14="http://schemas.microsoft.com/office/powerpoint/2010/main" val="2936212220"/>
-      </p:ext>
-    </p:extLst>
-  </p:cSld>
-  <p:clrMapOvr>
-    <a:masterClrMapping/>
-  </p:clrMapOvr>
-</p:sld>
-</file>
-
-<file path=ppt/slides/slide27.xml><?xml version="1.0" encoding="utf-8"?>
-<p:sld xmlns:a="http://schemas.openxmlformats.org/drawingml/2006/main" xmlns:r="http://schemas.openxmlformats.org/officeDocument/2006/relationships" xmlns:p="http://schemas.openxmlformats.org/presentationml/2006/main">
-  <p:cSld>
-    <p:spTree>
-      <p:nvGrpSpPr>
-        <p:cNvPr id="1" name=""/>
-        <p:cNvGrpSpPr/>
-        <p:nvPr/>
-      </p:nvGrpSpPr>
-      <p:grpSpPr>
-        <a:xfrm>
-          <a:off x="0" y="0"/>
-          <a:ext cx="0" cy="0"/>
-          <a:chOff x="0" y="0"/>
-          <a:chExt cx="0" cy="0"/>
-        </a:xfrm>
-      </p:grpSpPr>
-      <p:pic>
-        <p:nvPicPr>
-          <p:cNvPr id="4" name="Afbeelding 3">
-            <a:extLst>
-              <a:ext uri="{FF2B5EF4-FFF2-40B4-BE49-F238E27FC236}">
-                <a16:creationId xmlns:a16="http://schemas.microsoft.com/office/drawing/2014/main" id="{01E4E48F-82AB-4C7B-9D23-80E82BA09E08}"/>
-              </a:ext>
-            </a:extLst>
-          </p:cNvPr>
-          <p:cNvPicPr>
-            <a:picLocks noChangeAspect="1"/>
-          </p:cNvPicPr>
-          <p:nvPr/>
-        </p:nvPicPr>
-        <p:blipFill>
-          <a:blip r:embed="rId2"/>
-          <a:stretch>
-            <a:fillRect/>
-          </a:stretch>
-        </p:blipFill>
-        <p:spPr>
-          <a:xfrm>
-            <a:off x="0" y="0"/>
-            <a:ext cx="6235543" cy="4297680"/>
-          </a:xfrm>
-          <a:prstGeom prst="rect">
-            <a:avLst/>
-          </a:prstGeom>
-        </p:spPr>
-      </p:pic>
-      <p:pic>
-        <p:nvPicPr>
-          <p:cNvPr id="5" name="Afbeelding 4">
-            <a:extLst>
-              <a:ext uri="{FF2B5EF4-FFF2-40B4-BE49-F238E27FC236}">
-                <a16:creationId xmlns:a16="http://schemas.microsoft.com/office/drawing/2014/main" id="{195B2660-A867-47A2-8BA9-9EEB71C7CF8A}"/>
-              </a:ext>
-            </a:extLst>
-          </p:cNvPr>
-          <p:cNvPicPr>
-            <a:picLocks noChangeAspect="1"/>
-          </p:cNvPicPr>
-          <p:nvPr/>
-        </p:nvPicPr>
-        <p:blipFill>
-          <a:blip r:embed="rId3"/>
-          <a:stretch>
-            <a:fillRect/>
-          </a:stretch>
-        </p:blipFill>
-        <p:spPr>
-          <a:xfrm>
-            <a:off x="4411981" y="3625801"/>
-            <a:ext cx="7780020" cy="3232200"/>
-          </a:xfrm>
-          <a:prstGeom prst="rect">
-            <a:avLst/>
-          </a:prstGeom>
-        </p:spPr>
-      </p:pic>
-    </p:spTree>
-    <p:extLst>
-      <p:ext uri="{BB962C8B-B14F-4D97-AF65-F5344CB8AC3E}">
-        <p14:creationId xmlns:p14="http://schemas.microsoft.com/office/powerpoint/2010/main" val="3463477211"/>
-      </p:ext>
-    </p:extLst>
-  </p:cSld>
-  <p:clrMapOvr>
-    <a:masterClrMapping/>
-  </p:clrMapOvr>
-</p:sld>
-</file>
-
-<file path=ppt/slides/slide28.xml><?xml version="1.0" encoding="utf-8"?>
-<p:sld xmlns:a="http://schemas.openxmlformats.org/drawingml/2006/main" xmlns:r="http://schemas.openxmlformats.org/officeDocument/2006/relationships" xmlns:p="http://schemas.openxmlformats.org/presentationml/2006/main">
-  <p:cSld>
-    <p:spTree>
-      <p:nvGrpSpPr>
-        <p:cNvPr id="1" name=""/>
-        <p:cNvGrpSpPr/>
-        <p:nvPr/>
-      </p:nvGrpSpPr>
-      <p:grpSpPr>
-        <a:xfrm>
-          <a:off x="0" y="0"/>
-          <a:ext cx="0" cy="0"/>
-          <a:chOff x="0" y="0"/>
-          <a:chExt cx="0" cy="0"/>
-        </a:xfrm>
-      </p:grpSpPr>
-      <p:pic>
-        <p:nvPicPr>
-          <p:cNvPr id="4" name="Afbeelding 3">
-            <a:extLst>
-              <a:ext uri="{FF2B5EF4-FFF2-40B4-BE49-F238E27FC236}">
-                <a16:creationId xmlns:a16="http://schemas.microsoft.com/office/drawing/2014/main" id="{62798C72-C580-463F-9AA6-437628E16EC1}"/>
-              </a:ext>
-            </a:extLst>
-          </p:cNvPr>
-          <p:cNvPicPr>
-            <a:picLocks noChangeAspect="1"/>
-          </p:cNvPicPr>
-          <p:nvPr/>
-        </p:nvPicPr>
-        <p:blipFill>
-          <a:blip r:embed="rId2"/>
-          <a:stretch>
-            <a:fillRect/>
-          </a:stretch>
-        </p:blipFill>
-        <p:spPr>
-          <a:xfrm>
-            <a:off x="-1" y="0"/>
-            <a:ext cx="8652387" cy="5029200"/>
-          </a:xfrm>
-          <a:prstGeom prst="rect">
-            <a:avLst/>
-          </a:prstGeom>
-        </p:spPr>
-      </p:pic>
-      <p:pic>
-        <p:nvPicPr>
-          <p:cNvPr id="5" name="Afbeelding 4">
-            <a:extLst>
-              <a:ext uri="{FF2B5EF4-FFF2-40B4-BE49-F238E27FC236}">
-                <a16:creationId xmlns:a16="http://schemas.microsoft.com/office/drawing/2014/main" id="{48C8FB90-33F4-4FD4-A419-96A8B27144D4}"/>
-              </a:ext>
-            </a:extLst>
-          </p:cNvPr>
-          <p:cNvPicPr>
-            <a:picLocks noChangeAspect="1"/>
-          </p:cNvPicPr>
-          <p:nvPr/>
-        </p:nvPicPr>
-        <p:blipFill>
-          <a:blip r:embed="rId3"/>
-          <a:stretch>
-            <a:fillRect/>
-          </a:stretch>
-        </p:blipFill>
-        <p:spPr>
-          <a:xfrm>
-            <a:off x="3456882" y="5368290"/>
-            <a:ext cx="8735118" cy="1489710"/>
-          </a:xfrm>
-          <a:prstGeom prst="rect">
-            <a:avLst/>
-          </a:prstGeom>
-        </p:spPr>
-      </p:pic>
-    </p:spTree>
-    <p:extLst>
-      <p:ext uri="{BB962C8B-B14F-4D97-AF65-F5344CB8AC3E}">
-        <p14:creationId xmlns:p14="http://schemas.microsoft.com/office/powerpoint/2010/main" val="3403717277"/>
       </p:ext>
     </p:extLst>
   </p:cSld>

</xml_diff>